<commit_message>
updated the format of my slides
</commit_message>
<xml_diff>
--- a/Economic Analysis (1).pptx
+++ b/Economic Analysis (1).pptx
@@ -124,23 +124,55 @@
   <pc:docChgLst>
     <pc:chgData name="Sai Chikkala" userId="fc537e23deb61d4a" providerId="LiveId" clId="{4C5AE476-8132-4067-BD09-6A98EECE78FE}"/>
     <pc:docChg chg="addSld modSld">
-      <pc:chgData name="Sai Chikkala" userId="fc537e23deb61d4a" providerId="LiveId" clId="{4C5AE476-8132-4067-BD09-6A98EECE78FE}" dt="2019-07-05T19:17:49.232" v="1"/>
+      <pc:chgData name="Sai Chikkala" userId="fc537e23deb61d4a" providerId="LiveId" clId="{4C5AE476-8132-4067-BD09-6A98EECE78FE}" dt="2019-07-05T19:31:04.413" v="36" actId="1076"/>
       <pc:docMkLst>
         <pc:docMk/>
       </pc:docMkLst>
-      <pc:sldChg chg="add">
-        <pc:chgData name="Sai Chikkala" userId="fc537e23deb61d4a" providerId="LiveId" clId="{4C5AE476-8132-4067-BD09-6A98EECE78FE}" dt="2019-07-05T19:17:28.502" v="0"/>
+      <pc:sldChg chg="modSp add">
+        <pc:chgData name="Sai Chikkala" userId="fc537e23deb61d4a" providerId="LiveId" clId="{4C5AE476-8132-4067-BD09-6A98EECE78FE}" dt="2019-07-05T19:30:04.659" v="21" actId="1076"/>
         <pc:sldMkLst>
           <pc:docMk/>
           <pc:sldMk cId="1304743027" sldId="262"/>
         </pc:sldMkLst>
+        <pc:picChg chg="mod">
+          <ac:chgData name="Sai Chikkala" userId="fc537e23deb61d4a" providerId="LiveId" clId="{4C5AE476-8132-4067-BD09-6A98EECE78FE}" dt="2019-07-05T19:30:03.419" v="20" actId="1076"/>
+          <ac:picMkLst>
+            <pc:docMk/>
+            <pc:sldMk cId="1304743027" sldId="262"/>
+            <ac:picMk id="4" creationId="{A051CA12-F7E4-49F4-973F-B94A0B72FA36}"/>
+          </ac:picMkLst>
+        </pc:picChg>
+        <pc:picChg chg="mod">
+          <ac:chgData name="Sai Chikkala" userId="fc537e23deb61d4a" providerId="LiveId" clId="{4C5AE476-8132-4067-BD09-6A98EECE78FE}" dt="2019-07-05T19:30:04.659" v="21" actId="1076"/>
+          <ac:picMkLst>
+            <pc:docMk/>
+            <pc:sldMk cId="1304743027" sldId="262"/>
+            <ac:picMk id="6" creationId="{857C57FE-13BE-4AC1-A1E6-2A31D1BCA53B}"/>
+          </ac:picMkLst>
+        </pc:picChg>
       </pc:sldChg>
-      <pc:sldChg chg="add">
-        <pc:chgData name="Sai Chikkala" userId="fc537e23deb61d4a" providerId="LiveId" clId="{4C5AE476-8132-4067-BD09-6A98EECE78FE}" dt="2019-07-05T19:17:49.232" v="1"/>
+      <pc:sldChg chg="modSp add">
+        <pc:chgData name="Sai Chikkala" userId="fc537e23deb61d4a" providerId="LiveId" clId="{4C5AE476-8132-4067-BD09-6A98EECE78FE}" dt="2019-07-05T19:31:04.413" v="36" actId="1076"/>
         <pc:sldMkLst>
           <pc:docMk/>
           <pc:sldMk cId="2372760837" sldId="263"/>
         </pc:sldMkLst>
+        <pc:picChg chg="mod">
+          <ac:chgData name="Sai Chikkala" userId="fc537e23deb61d4a" providerId="LiveId" clId="{4C5AE476-8132-4067-BD09-6A98EECE78FE}" dt="2019-07-05T19:30:58.049" v="34" actId="1076"/>
+          <ac:picMkLst>
+            <pc:docMk/>
+            <pc:sldMk cId="2372760837" sldId="263"/>
+            <ac:picMk id="5" creationId="{171ACA02-B1E5-4150-8189-5749048898DB}"/>
+          </ac:picMkLst>
+        </pc:picChg>
+        <pc:picChg chg="mod">
+          <ac:chgData name="Sai Chikkala" userId="fc537e23deb61d4a" providerId="LiveId" clId="{4C5AE476-8132-4067-BD09-6A98EECE78FE}" dt="2019-07-05T19:31:04.413" v="36" actId="1076"/>
+          <ac:picMkLst>
+            <pc:docMk/>
+            <pc:sldMk cId="2372760837" sldId="263"/>
+            <ac:picMk id="7" creationId="{B458D3E3-FE1A-46DD-8EC9-E13D529E08E4}"/>
+          </ac:picMkLst>
+        </pc:picChg>
       </pc:sldChg>
     </pc:docChg>
   </pc:docChgLst>
@@ -7573,8 +7605,8 @@
         </p:blipFill>
         <p:spPr>
           <a:xfrm>
-            <a:off x="0" y="1314506"/>
-            <a:ext cx="6096000" cy="3918857"/>
+            <a:off x="0" y="2995550"/>
+            <a:ext cx="5957456" cy="3829793"/>
           </a:xfrm>
           <a:prstGeom prst="rect">
             <a:avLst/>
@@ -7609,8 +7641,8 @@
         </p:blipFill>
         <p:spPr>
           <a:xfrm>
-            <a:off x="6096000" y="2935117"/>
-            <a:ext cx="6096000" cy="3918858"/>
+            <a:off x="6234546" y="2995549"/>
+            <a:ext cx="5957454" cy="3829793"/>
           </a:xfrm>
           <a:prstGeom prst="rect">
             <a:avLst/>
@@ -7711,8 +7743,8 @@
         </p:blipFill>
         <p:spPr>
           <a:xfrm>
-            <a:off x="-1" y="1372981"/>
-            <a:ext cx="6096003" cy="4572002"/>
+            <a:off x="775852" y="2774371"/>
+            <a:ext cx="5320148" cy="3990111"/>
           </a:xfrm>
           <a:prstGeom prst="rect">
             <a:avLst/>
@@ -7747,8 +7779,8 @@
         </p:blipFill>
         <p:spPr>
           <a:xfrm>
-            <a:off x="6096000" y="2285999"/>
-            <a:ext cx="6096002" cy="4572002"/>
+            <a:off x="6442363" y="2774370"/>
+            <a:ext cx="5320148" cy="3990112"/>
           </a:xfrm>
           <a:prstGeom prst="rect">
             <a:avLst/>

</xml_diff>